<commit_message>
Update events lecture and add materials
</commit_message>
<xml_diff>
--- a/events_jquery_js_frameworks_overview/events_jquery_js_frameworks_overview.pptx
+++ b/events_jquery_js_frameworks_overview/events_jquery_js_frameworks_overview.pptx
@@ -250,7 +250,7 @@
             <a:fld id="{39EEAABF-1A21-4BDA-A92C-F0636835B84E}" type="datetimeFigureOut">
               <a:rPr lang="en-US" smtClean="0"/>
               <a:pPr/>
-              <a:t>12/4/2017</a:t>
+              <a:t>12/5/2017</a:t>
             </a:fld>
             <a:endParaRPr lang="en-US" dirty="0"/>
           </a:p>
@@ -2229,7 +2229,7 @@
             <a:fld id="{7138E089-62ED-4B99-9D85-4233106172C3}" type="datetime1">
               <a:rPr lang="ru-RU" smtClean="0"/>
               <a:pPr/>
-              <a:t>04.12.2017</a:t>
+              <a:t>05.12.2017</a:t>
             </a:fld>
             <a:endParaRPr lang="ru-RU" dirty="0"/>
           </a:p>
@@ -2402,7 +2402,7 @@
             <a:fld id="{1C55742B-6A67-44BA-9E65-E8ED5897B169}" type="datetime1">
               <a:rPr lang="ru-RU" smtClean="0"/>
               <a:pPr/>
-              <a:t>04.12.2017</a:t>
+              <a:t>05.12.2017</a:t>
             </a:fld>
             <a:endParaRPr lang="ru-RU" dirty="0"/>
           </a:p>
@@ -2585,7 +2585,7 @@
             <a:fld id="{31D9B4FD-8306-4B74-B1F8-D2E67870986E}" type="datetime1">
               <a:rPr lang="ru-RU" smtClean="0"/>
               <a:pPr/>
-              <a:t>04.12.2017</a:t>
+              <a:t>05.12.2017</a:t>
             </a:fld>
             <a:endParaRPr lang="ru-RU" dirty="0"/>
           </a:p>
@@ -2758,7 +2758,7 @@
             <a:fld id="{32E4D2F2-8EAD-4248-A8AF-937EE57F2432}" type="datetime1">
               <a:rPr lang="ru-RU" smtClean="0"/>
               <a:pPr/>
-              <a:t>04.12.2017</a:t>
+              <a:t>05.12.2017</a:t>
             </a:fld>
             <a:endParaRPr lang="ru-RU" dirty="0"/>
           </a:p>
@@ -3008,7 +3008,7 @@
             <a:fld id="{FB71B655-9686-4700-A3E3-2677DD26807C}" type="datetime1">
               <a:rPr lang="ru-RU" smtClean="0"/>
               <a:pPr/>
-              <a:t>04.12.2017</a:t>
+              <a:t>05.12.2017</a:t>
             </a:fld>
             <a:endParaRPr lang="ru-RU" dirty="0"/>
           </a:p>
@@ -3298,7 +3298,7 @@
             <a:fld id="{4AEFA3A0-0963-40F8-917D-76DEAAEFC216}" type="datetime1">
               <a:rPr lang="ru-RU" smtClean="0"/>
               <a:pPr/>
-              <a:t>04.12.2017</a:t>
+              <a:t>05.12.2017</a:t>
             </a:fld>
             <a:endParaRPr lang="ru-RU" dirty="0"/>
           </a:p>
@@ -3722,7 +3722,7 @@
             <a:fld id="{DEF2FADE-2241-4AB9-A208-782AC4633E65}" type="datetime1">
               <a:rPr lang="ru-RU" smtClean="0"/>
               <a:pPr/>
-              <a:t>04.12.2017</a:t>
+              <a:t>05.12.2017</a:t>
             </a:fld>
             <a:endParaRPr lang="ru-RU" dirty="0"/>
           </a:p>
@@ -3844,7 +3844,7 @@
             <a:fld id="{F73ABB79-FB1F-4563-8AEC-F75E8EA4533C}" type="datetime1">
               <a:rPr lang="ru-RU" smtClean="0"/>
               <a:pPr/>
-              <a:t>04.12.2017</a:t>
+              <a:t>05.12.2017</a:t>
             </a:fld>
             <a:endParaRPr lang="ru-RU" dirty="0"/>
           </a:p>
@@ -3944,7 +3944,7 @@
             <a:fld id="{698CEBD2-D067-4C87-98E7-17140CF67479}" type="datetime1">
               <a:rPr lang="ru-RU" smtClean="0"/>
               <a:pPr/>
-              <a:t>04.12.2017</a:t>
+              <a:t>05.12.2017</a:t>
             </a:fld>
             <a:endParaRPr lang="ru-RU" dirty="0"/>
           </a:p>
@@ -4224,7 +4224,7 @@
             <a:fld id="{98A170F8-514C-479C-AACB-5022023134F7}" type="datetime1">
               <a:rPr lang="ru-RU" smtClean="0"/>
               <a:pPr/>
-              <a:t>04.12.2017</a:t>
+              <a:t>05.12.2017</a:t>
             </a:fld>
             <a:endParaRPr lang="ru-RU" dirty="0"/>
           </a:p>
@@ -4484,7 +4484,7 @@
             <a:fld id="{AA83611C-DD27-4ADB-92CD-801180824883}" type="datetime1">
               <a:rPr lang="ru-RU" smtClean="0"/>
               <a:pPr/>
-              <a:t>04.12.2017</a:t>
+              <a:t>05.12.2017</a:t>
             </a:fld>
             <a:endParaRPr lang="ru-RU" dirty="0"/>
           </a:p>
@@ -4703,7 +4703,7 @@
             <a:fld id="{772C2E8B-7AD5-4B74-A391-C1BAFFD06762}" type="datetime1">
               <a:rPr lang="ru-RU" smtClean="0"/>
               <a:pPr/>
-              <a:t>04.12.2017</a:t>
+              <a:t>05.12.2017</a:t>
             </a:fld>
             <a:endParaRPr lang="ru-RU" dirty="0"/>
           </a:p>
@@ -10173,13 +10173,6 @@
               </a:rPr>
               <a:t>модели</a:t>
             </a:r>
-            <a:endParaRPr lang="ru-RU" sz="2800" dirty="0">
-              <a:solidFill>
-                <a:srgbClr val="D04E1D"/>
-              </a:solidFill>
-              <a:latin typeface="Segoe UI Light" panose="020B0502040204020203" pitchFamily="34" charset="0"/>
-              <a:cs typeface="Segoe UI Light" panose="020B0502040204020203" pitchFamily="34" charset="0"/>
-            </a:endParaRPr>
           </a:p>
         </p:txBody>
       </p:sp>
@@ -10612,6 +10605,63 @@
               </a:rPr>
               <a:t>&lt;script&gt;</a:t>
             </a:r>
+          </a:p>
+          <a:p>
+            <a:pPr lvl="1"/>
+            <a:r>
+              <a:rPr lang="en-US" dirty="0" smtClean="0">
+                <a:solidFill>
+                  <a:schemeClr val="tx1"/>
+                </a:solidFill>
+              </a:rPr>
+              <a:t>	function </a:t>
+            </a:r>
+            <a:r>
+              <a:rPr lang="en-US" b="1" dirty="0">
+                <a:solidFill>
+                  <a:srgbClr val="FF0000"/>
+                </a:solidFill>
+              </a:rPr>
+              <a:t>handler</a:t>
+            </a:r>
+            <a:r>
+              <a:rPr lang="en-US" dirty="0" smtClean="0">
+                <a:solidFill>
+                  <a:schemeClr val="tx1"/>
+                </a:solidFill>
+              </a:rPr>
+              <a:t>(){</a:t>
+            </a:r>
+            <a:br>
+              <a:rPr lang="en-US" dirty="0" smtClean="0">
+                <a:solidFill>
+                  <a:schemeClr val="tx1"/>
+                </a:solidFill>
+              </a:rPr>
+            </a:br>
+            <a:r>
+              <a:rPr lang="en-US" dirty="0" smtClean="0">
+                <a:solidFill>
+                  <a:schemeClr val="tx1"/>
+                </a:solidFill>
+              </a:rPr>
+              <a:t>	      // Your code</a:t>
+            </a:r>
+            <a:br>
+              <a:rPr lang="en-US" dirty="0" smtClean="0">
+                <a:solidFill>
+                  <a:schemeClr val="tx1"/>
+                </a:solidFill>
+              </a:rPr>
+            </a:br>
+            <a:r>
+              <a:rPr lang="en-US" dirty="0" smtClean="0">
+                <a:solidFill>
+                  <a:schemeClr val="tx1"/>
+                </a:solidFill>
+              </a:rPr>
+              <a:t>	}</a:t>
+            </a:r>
             <a:endParaRPr lang="en-US" dirty="0">
               <a:solidFill>
                 <a:schemeClr val="tx1"/>
@@ -10621,68 +10671,6 @@
           <a:p>
             <a:pPr lvl="1"/>
             <a:r>
-              <a:rPr lang="en-US" dirty="0" smtClean="0">
-                <a:solidFill>
-                  <a:schemeClr val="tx1"/>
-                </a:solidFill>
-              </a:rPr>
-              <a:t>	function </a:t>
-            </a:r>
-            <a:r>
-              <a:rPr lang="en-US" b="1" dirty="0">
-                <a:solidFill>
-                  <a:srgbClr val="FF0000"/>
-                </a:solidFill>
-              </a:rPr>
-              <a:t>handler</a:t>
-            </a:r>
-            <a:r>
-              <a:rPr lang="en-US" dirty="0" smtClean="0">
-                <a:solidFill>
-                  <a:schemeClr val="tx1"/>
-                </a:solidFill>
-              </a:rPr>
-              <a:t>(){</a:t>
-            </a:r>
-            <a:br>
-              <a:rPr lang="en-US" dirty="0" smtClean="0">
-                <a:solidFill>
-                  <a:schemeClr val="tx1"/>
-                </a:solidFill>
-              </a:rPr>
-            </a:br>
-            <a:r>
-              <a:rPr lang="en-US" dirty="0" smtClean="0">
-                <a:solidFill>
-                  <a:schemeClr val="tx1"/>
-                </a:solidFill>
-              </a:rPr>
-              <a:t>	      // Your code</a:t>
-            </a:r>
-            <a:br>
-              <a:rPr lang="en-US" dirty="0" smtClean="0">
-                <a:solidFill>
-                  <a:schemeClr val="tx1"/>
-                </a:solidFill>
-              </a:rPr>
-            </a:br>
-            <a:r>
-              <a:rPr lang="en-US" dirty="0" smtClean="0">
-                <a:solidFill>
-                  <a:schemeClr val="tx1"/>
-                </a:solidFill>
-              </a:rPr>
-              <a:t>	}</a:t>
-            </a:r>
-            <a:endParaRPr lang="en-US" dirty="0">
-              <a:solidFill>
-                <a:schemeClr val="tx1"/>
-              </a:solidFill>
-            </a:endParaRPr>
-          </a:p>
-          <a:p>
-            <a:pPr lvl="1"/>
-            <a:r>
               <a:rPr lang="en-US" dirty="0">
                 <a:solidFill>
                   <a:schemeClr val="tx1"/>
@@ -10690,11 +10678,6 @@
               </a:rPr>
               <a:t>&lt;/script&gt;</a:t>
             </a:r>
-            <a:endParaRPr lang="en-US" dirty="0">
-              <a:solidFill>
-                <a:schemeClr val="tx1"/>
-              </a:solidFill>
-            </a:endParaRPr>
           </a:p>
         </p:txBody>
       </p:sp>
@@ -10767,6 +10750,112 @@
               </a:rPr>
               <a:t>”&gt;&lt;/p&gt;</a:t>
             </a:r>
+          </a:p>
+          <a:p>
+            <a:r>
+              <a:rPr lang="en-US" dirty="0">
+                <a:solidFill>
+                  <a:schemeClr val="tx1"/>
+                </a:solidFill>
+              </a:rPr>
+              <a:t>&lt;script&gt;</a:t>
+            </a:r>
+          </a:p>
+          <a:p>
+            <a:pPr lvl="1"/>
+            <a:r>
+              <a:rPr lang="en-US" dirty="0" err="1" smtClean="0">
+                <a:solidFill>
+                  <a:schemeClr val="tx1"/>
+                </a:solidFill>
+              </a:rPr>
+              <a:t>var</a:t>
+            </a:r>
+            <a:r>
+              <a:rPr lang="en-US" dirty="0" smtClean="0">
+                <a:solidFill>
+                  <a:schemeClr val="tx1"/>
+                </a:solidFill>
+              </a:rPr>
+              <a:t> el </a:t>
+            </a:r>
+            <a:r>
+              <a:rPr lang="en-US" dirty="0">
+                <a:solidFill>
+                  <a:schemeClr val="tx1"/>
+                </a:solidFill>
+              </a:rPr>
+              <a:t>= </a:t>
+            </a:r>
+            <a:r>
+              <a:rPr lang="en-US" dirty="0" err="1">
+                <a:solidFill>
+                  <a:schemeClr val="tx1"/>
+                </a:solidFill>
+              </a:rPr>
+              <a:t>document.getElementById</a:t>
+            </a:r>
+            <a:r>
+              <a:rPr lang="en-US" dirty="0">
+                <a:solidFill>
+                  <a:schemeClr val="tx1"/>
+                </a:solidFill>
+              </a:rPr>
+              <a:t>(“</a:t>
+            </a:r>
+            <a:r>
+              <a:rPr lang="en-US" dirty="0">
+                <a:solidFill>
+                  <a:srgbClr val="FF0000"/>
+                </a:solidFill>
+              </a:rPr>
+              <a:t>test</a:t>
+            </a:r>
+            <a:r>
+              <a:rPr lang="en-US" dirty="0">
+                <a:solidFill>
+                  <a:schemeClr val="tx1"/>
+                </a:solidFill>
+              </a:rPr>
+              <a:t>”);</a:t>
+            </a:r>
+          </a:p>
+          <a:p>
+            <a:pPr lvl="1"/>
+            <a:r>
+              <a:rPr lang="en-US" dirty="0" err="1" smtClean="0">
+                <a:solidFill>
+                  <a:schemeClr val="tx1"/>
+                </a:solidFill>
+              </a:rPr>
+              <a:t>el.</a:t>
+            </a:r>
+            <a:r>
+              <a:rPr lang="en-US" b="1" dirty="0" err="1" smtClean="0">
+                <a:solidFill>
+                  <a:schemeClr val="accent1">
+                    <a:lumMod val="75000"/>
+                  </a:schemeClr>
+                </a:solidFill>
+              </a:rPr>
+              <a:t>onclick</a:t>
+            </a:r>
+            <a:r>
+              <a:rPr lang="en-US" dirty="0">
+                <a:solidFill>
+                  <a:schemeClr val="tx1"/>
+                </a:solidFill>
+              </a:rPr>
+              <a:t>= function</a:t>
+            </a:r>
+            <a:r>
+              <a:rPr lang="en-US" dirty="0" smtClean="0">
+                <a:solidFill>
+                  <a:schemeClr val="tx1"/>
+                </a:solidFill>
+              </a:rPr>
+              <a:t>(){ /* Your code*/}</a:t>
+            </a:r>
             <a:endParaRPr lang="en-US" dirty="0">
               <a:solidFill>
                 <a:schemeClr val="tx1"/>
@@ -10780,134 +10869,8 @@
                   <a:schemeClr val="tx1"/>
                 </a:solidFill>
               </a:rPr>
-              <a:t>&lt;script&gt;</a:t>
-            </a:r>
-            <a:endParaRPr lang="en-US" dirty="0">
-              <a:solidFill>
-                <a:schemeClr val="tx1"/>
-              </a:solidFill>
-            </a:endParaRPr>
-          </a:p>
-          <a:p>
-            <a:pPr lvl="1"/>
-            <a:r>
-              <a:rPr lang="en-US" dirty="0" err="1" smtClean="0">
-                <a:solidFill>
-                  <a:schemeClr val="tx1"/>
-                </a:solidFill>
-              </a:rPr>
-              <a:t>var</a:t>
-            </a:r>
-            <a:r>
-              <a:rPr lang="en-US" dirty="0" smtClean="0">
-                <a:solidFill>
-                  <a:schemeClr val="tx1"/>
-                </a:solidFill>
-              </a:rPr>
-              <a:t> el </a:t>
-            </a:r>
-            <a:r>
-              <a:rPr lang="en-US" dirty="0">
-                <a:solidFill>
-                  <a:schemeClr val="tx1"/>
-                </a:solidFill>
-              </a:rPr>
-              <a:t>= </a:t>
-            </a:r>
-            <a:r>
-              <a:rPr lang="en-US" dirty="0" err="1">
-                <a:solidFill>
-                  <a:schemeClr val="tx1"/>
-                </a:solidFill>
-              </a:rPr>
-              <a:t>document.getElementById</a:t>
-            </a:r>
-            <a:r>
-              <a:rPr lang="en-US" dirty="0">
-                <a:solidFill>
-                  <a:schemeClr val="tx1"/>
-                </a:solidFill>
-              </a:rPr>
-              <a:t>(“</a:t>
-            </a:r>
-            <a:r>
-              <a:rPr lang="en-US" dirty="0">
-                <a:solidFill>
-                  <a:srgbClr val="FF0000"/>
-                </a:solidFill>
-              </a:rPr>
-              <a:t>test</a:t>
-            </a:r>
-            <a:r>
-              <a:rPr lang="en-US" dirty="0">
-                <a:solidFill>
-                  <a:schemeClr val="tx1"/>
-                </a:solidFill>
-              </a:rPr>
-              <a:t>”);</a:t>
-            </a:r>
-            <a:endParaRPr lang="en-US" dirty="0">
-              <a:solidFill>
-                <a:schemeClr val="tx1"/>
-              </a:solidFill>
-            </a:endParaRPr>
-          </a:p>
-          <a:p>
-            <a:pPr lvl="1"/>
-            <a:r>
-              <a:rPr lang="en-US" dirty="0" err="1" smtClean="0">
-                <a:solidFill>
-                  <a:schemeClr val="tx1"/>
-                </a:solidFill>
-              </a:rPr>
-              <a:t>el.</a:t>
-            </a:r>
-            <a:r>
-              <a:rPr lang="en-US" b="1" dirty="0" err="1" smtClean="0">
-                <a:solidFill>
-                  <a:schemeClr val="accent1">
-                    <a:lumMod val="75000"/>
-                  </a:schemeClr>
-                </a:solidFill>
-              </a:rPr>
-              <a:t>onclick</a:t>
-            </a:r>
-            <a:r>
-              <a:rPr lang="en-US" dirty="0">
-                <a:solidFill>
-                  <a:schemeClr val="tx1"/>
-                </a:solidFill>
-              </a:rPr>
-              <a:t>= function</a:t>
-            </a:r>
-            <a:r>
-              <a:rPr lang="en-US" dirty="0" smtClean="0">
-                <a:solidFill>
-                  <a:schemeClr val="tx1"/>
-                </a:solidFill>
-              </a:rPr>
-              <a:t>(){ /* Your code*/}</a:t>
-            </a:r>
-            <a:endParaRPr lang="en-US" dirty="0">
-              <a:solidFill>
-                <a:schemeClr val="tx1"/>
-              </a:solidFill>
-            </a:endParaRPr>
-          </a:p>
-          <a:p>
-            <a:r>
-              <a:rPr lang="en-US" dirty="0">
-                <a:solidFill>
-                  <a:schemeClr val="tx1"/>
-                </a:solidFill>
-              </a:rPr>
               <a:t>&lt;/script&gt;</a:t>
             </a:r>
-            <a:endParaRPr lang="en-US" dirty="0">
-              <a:solidFill>
-                <a:schemeClr val="tx1"/>
-              </a:solidFill>
-            </a:endParaRPr>
           </a:p>
         </p:txBody>
       </p:sp>
@@ -11167,6 +11130,104 @@
               </a:rPr>
               <a:t>&lt;script&gt;</a:t>
             </a:r>
+          </a:p>
+          <a:p>
+            <a:pPr lvl="1"/>
+            <a:r>
+              <a:rPr lang="en-US" dirty="0" err="1" smtClean="0">
+                <a:solidFill>
+                  <a:schemeClr val="tx1"/>
+                </a:solidFill>
+              </a:rPr>
+              <a:t>var</a:t>
+            </a:r>
+            <a:r>
+              <a:rPr lang="en-US" dirty="0" smtClean="0">
+                <a:solidFill>
+                  <a:schemeClr val="tx1"/>
+                </a:solidFill>
+              </a:rPr>
+              <a:t> el </a:t>
+            </a:r>
+            <a:r>
+              <a:rPr lang="en-US" dirty="0">
+                <a:solidFill>
+                  <a:schemeClr val="tx1"/>
+                </a:solidFill>
+              </a:rPr>
+              <a:t>= </a:t>
+            </a:r>
+            <a:r>
+              <a:rPr lang="en-US" dirty="0" err="1">
+                <a:solidFill>
+                  <a:schemeClr val="tx1"/>
+                </a:solidFill>
+              </a:rPr>
+              <a:t>document.getElementById</a:t>
+            </a:r>
+            <a:r>
+              <a:rPr lang="en-US" dirty="0">
+                <a:solidFill>
+                  <a:schemeClr val="tx1"/>
+                </a:solidFill>
+              </a:rPr>
+              <a:t>(“</a:t>
+            </a:r>
+            <a:r>
+              <a:rPr lang="en-US" dirty="0">
+                <a:solidFill>
+                  <a:srgbClr val="FF0000"/>
+                </a:solidFill>
+              </a:rPr>
+              <a:t>test</a:t>
+            </a:r>
+            <a:r>
+              <a:rPr lang="en-US" dirty="0" smtClean="0">
+                <a:solidFill>
+                  <a:schemeClr val="tx1"/>
+                </a:solidFill>
+              </a:rPr>
+              <a:t>”);</a:t>
+            </a:r>
+            <a:br>
+              <a:rPr lang="en-US" dirty="0" smtClean="0">
+                <a:solidFill>
+                  <a:schemeClr val="tx1"/>
+                </a:solidFill>
+              </a:rPr>
+            </a:br>
+            <a:r>
+              <a:rPr lang="en-US" dirty="0" err="1" smtClean="0">
+                <a:solidFill>
+                  <a:schemeClr val="tx1"/>
+                </a:solidFill>
+              </a:rPr>
+              <a:t>var</a:t>
+            </a:r>
+            <a:r>
+              <a:rPr lang="en-US" dirty="0" smtClean="0">
+                <a:solidFill>
+                  <a:schemeClr val="tx1"/>
+                </a:solidFill>
+              </a:rPr>
+              <a:t> </a:t>
+            </a:r>
+            <a:r>
+              <a:rPr lang="en-US" dirty="0" smtClean="0">
+                <a:solidFill>
+                  <a:srgbClr val="FFFF00"/>
+                </a:solidFill>
+              </a:rPr>
+              <a:t>event</a:t>
+            </a:r>
+            <a:r>
+              <a:rPr lang="en-US" dirty="0" smtClean="0">
+                <a:solidFill>
+                  <a:schemeClr val="tx1"/>
+                </a:solidFill>
+              </a:rPr>
+              <a:t> = “click”;</a:t>
+            </a:r>
             <a:endParaRPr lang="en-US" dirty="0">
               <a:solidFill>
                 <a:schemeClr val="tx1"/>
@@ -11189,47 +11250,23 @@
                   <a:schemeClr val="tx1"/>
                 </a:solidFill>
               </a:rPr>
-              <a:t> el </a:t>
-            </a:r>
-            <a:r>
-              <a:rPr lang="en-US" dirty="0">
-                <a:solidFill>
-                  <a:schemeClr val="tx1"/>
-                </a:solidFill>
-              </a:rPr>
-              <a:t>= </a:t>
-            </a:r>
-            <a:r>
-              <a:rPr lang="en-US" dirty="0" err="1">
-                <a:solidFill>
-                  <a:schemeClr val="tx1"/>
-                </a:solidFill>
-              </a:rPr>
-              <a:t>document.getElementById</a:t>
-            </a:r>
-            <a:r>
-              <a:rPr lang="en-US" dirty="0">
-                <a:solidFill>
-                  <a:schemeClr val="tx1"/>
-                </a:solidFill>
-              </a:rPr>
-              <a:t>(“</a:t>
-            </a:r>
-            <a:r>
-              <a:rPr lang="en-US" dirty="0">
-                <a:solidFill>
-                  <a:srgbClr val="FF0000"/>
-                </a:solidFill>
-              </a:rPr>
-              <a:t>test</a:t>
+              <a:t> </a:t>
             </a:r>
             <a:r>
               <a:rPr lang="en-US" dirty="0" smtClean="0">
                 <a:solidFill>
-                  <a:schemeClr val="tx1"/>
-                </a:solidFill>
-              </a:rPr>
-              <a:t>”);</a:t>
+                  <a:srgbClr val="00B0F0"/>
+                </a:solidFill>
+              </a:rPr>
+              <a:t>handler</a:t>
+            </a:r>
+            <a:r>
+              <a:rPr lang="en-US" dirty="0" smtClean="0">
+                <a:solidFill>
+                  <a:schemeClr val="tx1"/>
+                </a:solidFill>
+              </a:rPr>
+              <a:t> = function(){ /* Your code*/}</a:t>
             </a:r>
             <a:br>
               <a:rPr lang="en-US" dirty="0" smtClean="0">
@@ -11257,10 +11294,10 @@
             <a:r>
               <a:rPr lang="en-US" dirty="0" smtClean="0">
                 <a:solidFill>
-                  <a:srgbClr val="FFFF00"/>
-                </a:solidFill>
-              </a:rPr>
-              <a:t>event</a:t>
+                  <a:srgbClr val="7030A0"/>
+                </a:solidFill>
+              </a:rPr>
+              <a:t>capture</a:t>
             </a:r>
             <a:r>
               <a:rPr lang="en-US" dirty="0" smtClean="0">
@@ -11268,47 +11305,7 @@
                   <a:schemeClr val="tx1"/>
                 </a:solidFill>
               </a:rPr>
-              <a:t> = “click”;</a:t>
-            </a:r>
-            <a:endParaRPr lang="en-US" dirty="0">
-              <a:solidFill>
-                <a:schemeClr val="tx1"/>
-              </a:solidFill>
-            </a:endParaRPr>
-          </a:p>
-          <a:p>
-            <a:pPr lvl="1"/>
-            <a:r>
-              <a:rPr lang="en-US" dirty="0" err="1" smtClean="0">
-                <a:solidFill>
-                  <a:schemeClr val="tx1"/>
-                </a:solidFill>
-              </a:rPr>
-              <a:t>var</a:t>
-            </a:r>
-            <a:r>
-              <a:rPr lang="en-US" dirty="0" smtClean="0">
-                <a:solidFill>
-                  <a:schemeClr val="tx1"/>
-                </a:solidFill>
-              </a:rPr>
-              <a:t> </a:t>
-            </a:r>
-            <a:r>
-              <a:rPr lang="en-US" dirty="0" smtClean="0">
-                <a:solidFill>
-                  <a:srgbClr val="00B0F0"/>
-                </a:solidFill>
-              </a:rPr>
-              <a:t>handler</a:t>
-            </a:r>
-            <a:r>
-              <a:rPr lang="en-US" dirty="0" smtClean="0">
-                <a:solidFill>
-                  <a:schemeClr val="tx1"/>
-                </a:solidFill>
-              </a:rPr>
-              <a:t> = function(){ /* Your code*/}</a:t>
+              <a:t> = true;</a:t>
             </a:r>
             <a:br>
               <a:rPr lang="en-US" dirty="0" smtClean="0">
@@ -11323,7 +11320,15 @@
                   <a:schemeClr val="tx1"/>
                 </a:solidFill>
               </a:rPr>
-              <a:t>var</a:t>
+              <a:t>el.</a:t>
+            </a:r>
+            <a:r>
+              <a:rPr lang="en-US" dirty="0" err="1" smtClean="0">
+                <a:solidFill>
+                  <a:srgbClr val="00B050"/>
+                </a:solidFill>
+              </a:rPr>
+              <a:t>addEventListener</a:t>
             </a:r>
             <a:r>
               <a:rPr lang="en-US" dirty="0" smtClean="0">
@@ -11331,118 +11336,66 @@
                   <a:schemeClr val="tx1"/>
                 </a:solidFill>
               </a:rPr>
-              <a:t> </a:t>
+              <a:t>(</a:t>
             </a:r>
             <a:r>
               <a:rPr lang="en-US" dirty="0" smtClean="0">
                 <a:solidFill>
+                  <a:srgbClr val="FFFF00"/>
+                </a:solidFill>
+              </a:rPr>
+              <a:t>event</a:t>
+            </a:r>
+            <a:r>
+              <a:rPr lang="en-US" dirty="0">
+                <a:solidFill>
+                  <a:schemeClr val="tx1"/>
+                </a:solidFill>
+              </a:rPr>
+              <a:t>, </a:t>
+            </a:r>
+            <a:r>
+              <a:rPr lang="en-US" dirty="0">
+                <a:solidFill>
+                  <a:srgbClr val="00B0F0"/>
+                </a:solidFill>
+              </a:rPr>
+              <a:t>handler</a:t>
+            </a:r>
+            <a:r>
+              <a:rPr lang="en-US" dirty="0">
+                <a:solidFill>
+                  <a:schemeClr val="tx1"/>
+                </a:solidFill>
+              </a:rPr>
+              <a:t>, </a:t>
+            </a:r>
+            <a:r>
+              <a:rPr lang="en-US" dirty="0">
+                <a:solidFill>
                   <a:srgbClr val="7030A0"/>
                 </a:solidFill>
               </a:rPr>
               <a:t>capture</a:t>
             </a:r>
             <a:r>
-              <a:rPr lang="en-US" dirty="0" smtClean="0">
-                <a:solidFill>
-                  <a:schemeClr val="tx1"/>
-                </a:solidFill>
-              </a:rPr>
-              <a:t> = true;</a:t>
-            </a:r>
-            <a:br>
-              <a:rPr lang="en-US" dirty="0" smtClean="0">
-                <a:solidFill>
-                  <a:schemeClr val="tx1"/>
-                </a:solidFill>
-              </a:rPr>
-            </a:br>
-            <a:r>
-              <a:rPr lang="en-US" dirty="0" err="1" smtClean="0">
-                <a:solidFill>
-                  <a:schemeClr val="tx1"/>
-                </a:solidFill>
-              </a:rPr>
-              <a:t>el.</a:t>
-            </a:r>
-            <a:r>
-              <a:rPr lang="en-US" dirty="0" err="1" smtClean="0">
-                <a:solidFill>
-                  <a:srgbClr val="00B050"/>
-                </a:solidFill>
-              </a:rPr>
-              <a:t>addEventListener</a:t>
-            </a:r>
-            <a:r>
-              <a:rPr lang="en-US" dirty="0" smtClean="0">
-                <a:solidFill>
-                  <a:schemeClr val="tx1"/>
-                </a:solidFill>
-              </a:rPr>
-              <a:t>(</a:t>
-            </a:r>
-            <a:r>
-              <a:rPr lang="en-US" dirty="0" smtClean="0">
-                <a:solidFill>
-                  <a:srgbClr val="FFFF00"/>
-                </a:solidFill>
-              </a:rPr>
-              <a:t>event</a:t>
-            </a:r>
-            <a:r>
               <a:rPr lang="en-US" dirty="0">
                 <a:solidFill>
                   <a:schemeClr val="tx1"/>
                 </a:solidFill>
               </a:rPr>
-              <a:t>, </a:t>
-            </a:r>
+              <a:t>);</a:t>
+            </a:r>
+          </a:p>
+          <a:p>
             <a:r>
               <a:rPr lang="en-US" dirty="0">
                 <a:solidFill>
-                  <a:srgbClr val="00B0F0"/>
-                </a:solidFill>
-              </a:rPr>
-              <a:t>handler</a:t>
-            </a:r>
-            <a:r>
-              <a:rPr lang="en-US" dirty="0">
-                <a:solidFill>
-                  <a:schemeClr val="tx1"/>
-                </a:solidFill>
-              </a:rPr>
-              <a:t>, </a:t>
-            </a:r>
-            <a:r>
-              <a:rPr lang="en-US" dirty="0">
-                <a:solidFill>
-                  <a:srgbClr val="7030A0"/>
-                </a:solidFill>
-              </a:rPr>
-              <a:t>capture</a:t>
-            </a:r>
-            <a:r>
-              <a:rPr lang="en-US" dirty="0">
-                <a:solidFill>
-                  <a:schemeClr val="tx1"/>
-                </a:solidFill>
-              </a:rPr>
-              <a:t>);</a:t>
-            </a:r>
-          </a:p>
-          <a:p>
-            <a:r>
-              <a:rPr lang="en-US" dirty="0">
-                <a:solidFill>
                   <a:schemeClr val="tx1"/>
                 </a:solidFill>
               </a:rPr>
               <a:t>&lt;/script&gt;</a:t>
             </a:r>
-            <a:endParaRPr lang="en-US" dirty="0">
-              <a:solidFill>
-                <a:schemeClr val="tx1"/>
-              </a:solidFill>
-            </a:endParaRPr>
           </a:p>
         </p:txBody>
       </p:sp>
@@ -11588,7 +11541,6 @@
               <a:rPr lang="ru-RU" dirty="0"/>
               <a:t>обработчик срабатывает на этапе всплывания.</a:t>
             </a:r>
-            <a:endParaRPr lang="ru-RU" dirty="0"/>
           </a:p>
           <a:p>
             <a:pPr marL="285750" indent="-285750">
@@ -11866,6 +11818,104 @@
               </a:rPr>
               <a:t>&lt;script&gt;</a:t>
             </a:r>
+          </a:p>
+          <a:p>
+            <a:pPr lvl="1"/>
+            <a:r>
+              <a:rPr lang="en-US" dirty="0" err="1" smtClean="0">
+                <a:solidFill>
+                  <a:schemeClr val="tx1"/>
+                </a:solidFill>
+              </a:rPr>
+              <a:t>var</a:t>
+            </a:r>
+            <a:r>
+              <a:rPr lang="en-US" dirty="0" smtClean="0">
+                <a:solidFill>
+                  <a:schemeClr val="tx1"/>
+                </a:solidFill>
+              </a:rPr>
+              <a:t> el </a:t>
+            </a:r>
+            <a:r>
+              <a:rPr lang="en-US" dirty="0">
+                <a:solidFill>
+                  <a:schemeClr val="tx1"/>
+                </a:solidFill>
+              </a:rPr>
+              <a:t>= </a:t>
+            </a:r>
+            <a:r>
+              <a:rPr lang="en-US" dirty="0" err="1">
+                <a:solidFill>
+                  <a:schemeClr val="tx1"/>
+                </a:solidFill>
+              </a:rPr>
+              <a:t>document.getElementById</a:t>
+            </a:r>
+            <a:r>
+              <a:rPr lang="en-US" dirty="0">
+                <a:solidFill>
+                  <a:schemeClr val="tx1"/>
+                </a:solidFill>
+              </a:rPr>
+              <a:t>(“</a:t>
+            </a:r>
+            <a:r>
+              <a:rPr lang="en-US" dirty="0">
+                <a:solidFill>
+                  <a:srgbClr val="FF0000"/>
+                </a:solidFill>
+              </a:rPr>
+              <a:t>test</a:t>
+            </a:r>
+            <a:r>
+              <a:rPr lang="en-US" dirty="0" smtClean="0">
+                <a:solidFill>
+                  <a:schemeClr val="tx1"/>
+                </a:solidFill>
+              </a:rPr>
+              <a:t>”);</a:t>
+            </a:r>
+            <a:br>
+              <a:rPr lang="en-US" dirty="0" smtClean="0">
+                <a:solidFill>
+                  <a:schemeClr val="tx1"/>
+                </a:solidFill>
+              </a:rPr>
+            </a:br>
+            <a:r>
+              <a:rPr lang="en-US" dirty="0" err="1" smtClean="0">
+                <a:solidFill>
+                  <a:schemeClr val="tx1"/>
+                </a:solidFill>
+              </a:rPr>
+              <a:t>var</a:t>
+            </a:r>
+            <a:r>
+              <a:rPr lang="en-US" dirty="0" smtClean="0">
+                <a:solidFill>
+                  <a:schemeClr val="tx1"/>
+                </a:solidFill>
+              </a:rPr>
+              <a:t> </a:t>
+            </a:r>
+            <a:r>
+              <a:rPr lang="en-US" dirty="0" smtClean="0">
+                <a:solidFill>
+                  <a:srgbClr val="FFFF00"/>
+                </a:solidFill>
+              </a:rPr>
+              <a:t>event</a:t>
+            </a:r>
+            <a:r>
+              <a:rPr lang="en-US" dirty="0" smtClean="0">
+                <a:solidFill>
+                  <a:schemeClr val="tx1"/>
+                </a:solidFill>
+              </a:rPr>
+              <a:t> = “click”;</a:t>
+            </a:r>
             <a:endParaRPr lang="en-US" dirty="0">
               <a:solidFill>
                 <a:schemeClr val="tx1"/>
@@ -11888,47 +11938,23 @@
                   <a:schemeClr val="tx1"/>
                 </a:solidFill>
               </a:rPr>
-              <a:t> el </a:t>
-            </a:r>
-            <a:r>
-              <a:rPr lang="en-US" dirty="0">
-                <a:solidFill>
-                  <a:schemeClr val="tx1"/>
-                </a:solidFill>
-              </a:rPr>
-              <a:t>= </a:t>
-            </a:r>
-            <a:r>
-              <a:rPr lang="en-US" dirty="0" err="1">
-                <a:solidFill>
-                  <a:schemeClr val="tx1"/>
-                </a:solidFill>
-              </a:rPr>
-              <a:t>document.getElementById</a:t>
-            </a:r>
-            <a:r>
-              <a:rPr lang="en-US" dirty="0">
-                <a:solidFill>
-                  <a:schemeClr val="tx1"/>
-                </a:solidFill>
-              </a:rPr>
-              <a:t>(“</a:t>
-            </a:r>
-            <a:r>
-              <a:rPr lang="en-US" dirty="0">
-                <a:solidFill>
-                  <a:srgbClr val="FF0000"/>
-                </a:solidFill>
-              </a:rPr>
-              <a:t>test</a:t>
+              <a:t> </a:t>
             </a:r>
             <a:r>
               <a:rPr lang="en-US" dirty="0" smtClean="0">
                 <a:solidFill>
-                  <a:schemeClr val="tx1"/>
-                </a:solidFill>
-              </a:rPr>
-              <a:t>”);</a:t>
+                  <a:srgbClr val="00B0F0"/>
+                </a:solidFill>
+              </a:rPr>
+              <a:t>handler</a:t>
+            </a:r>
+            <a:r>
+              <a:rPr lang="en-US" dirty="0" smtClean="0">
+                <a:solidFill>
+                  <a:schemeClr val="tx1"/>
+                </a:solidFill>
+              </a:rPr>
+              <a:t> = function(){ /* Your code*/}</a:t>
             </a:r>
             <a:br>
               <a:rPr lang="en-US" dirty="0" smtClean="0">
@@ -11943,7 +11969,15 @@
                   <a:schemeClr val="tx1"/>
                 </a:solidFill>
               </a:rPr>
-              <a:t>var</a:t>
+              <a:t>el.</a:t>
+            </a:r>
+            <a:r>
+              <a:rPr lang="en-US" dirty="0" err="1" smtClean="0">
+                <a:solidFill>
+                  <a:srgbClr val="00B050"/>
+                </a:solidFill>
+              </a:rPr>
+              <a:t>attachEvent</a:t>
             </a:r>
             <a:r>
               <a:rPr lang="en-US" dirty="0" smtClean="0">
@@ -11951,7 +11985,7 @@
                   <a:schemeClr val="tx1"/>
                 </a:solidFill>
               </a:rPr>
-              <a:t> </a:t>
+              <a:t>(</a:t>
             </a:r>
             <a:r>
               <a:rPr lang="en-US" dirty="0" smtClean="0">
@@ -11962,12 +11996,28 @@
               <a:t>event</a:t>
             </a:r>
             <a:r>
+              <a:rPr lang="en-US" dirty="0">
+                <a:solidFill>
+                  <a:schemeClr val="tx1"/>
+                </a:solidFill>
+              </a:rPr>
+              <a:t>, </a:t>
+            </a:r>
+            <a:r>
               <a:rPr lang="en-US" dirty="0" smtClean="0">
                 <a:solidFill>
-                  <a:schemeClr val="tx1"/>
-                </a:solidFill>
-              </a:rPr>
-              <a:t> = “click”;</a:t>
+                  <a:srgbClr val="00B0F0"/>
+                </a:solidFill>
+              </a:rPr>
+              <a:t>handler</a:t>
+            </a:r>
+            <a:r>
+              <a:rPr lang="en-US" dirty="0" smtClean="0">
+                <a:solidFill>
+                  <a:schemeClr val="tx1"/>
+                </a:solidFill>
+              </a:rPr>
+              <a:t>);</a:t>
             </a:r>
             <a:endParaRPr lang="en-US" dirty="0">
               <a:solidFill>
@@ -11976,122 +12026,14 @@
             </a:endParaRPr>
           </a:p>
           <a:p>
-            <a:pPr lvl="1"/>
-            <a:r>
-              <a:rPr lang="en-US" dirty="0" err="1" smtClean="0">
-                <a:solidFill>
-                  <a:schemeClr val="tx1"/>
-                </a:solidFill>
-              </a:rPr>
-              <a:t>var</a:t>
-            </a:r>
-            <a:r>
-              <a:rPr lang="en-US" dirty="0" smtClean="0">
-                <a:solidFill>
-                  <a:schemeClr val="tx1"/>
-                </a:solidFill>
-              </a:rPr>
-              <a:t> </a:t>
-            </a:r>
-            <a:r>
-              <a:rPr lang="en-US" dirty="0" smtClean="0">
-                <a:solidFill>
-                  <a:srgbClr val="00B0F0"/>
-                </a:solidFill>
-              </a:rPr>
-              <a:t>handler</a:t>
-            </a:r>
-            <a:r>
-              <a:rPr lang="en-US" dirty="0" smtClean="0">
-                <a:solidFill>
-                  <a:schemeClr val="tx1"/>
-                </a:solidFill>
-              </a:rPr>
-              <a:t> = function(){ /* Your code*/}</a:t>
-            </a:r>
-            <a:br>
-              <a:rPr lang="en-US" dirty="0" smtClean="0">
-                <a:solidFill>
-                  <a:schemeClr val="tx1"/>
-                </a:solidFill>
-              </a:rPr>
-            </a:br>
-            <a:r>
-              <a:rPr lang="en-US" dirty="0" err="1" smtClean="0">
-                <a:solidFill>
-                  <a:schemeClr val="tx1"/>
-                </a:solidFill>
-              </a:rPr>
-              <a:t>el.</a:t>
-            </a:r>
-            <a:r>
-              <a:rPr lang="en-US" dirty="0" err="1" smtClean="0">
-                <a:solidFill>
-                  <a:srgbClr val="00B050"/>
-                </a:solidFill>
-              </a:rPr>
-              <a:t>attachEvent</a:t>
-            </a:r>
-            <a:r>
-              <a:rPr lang="en-US" dirty="0" smtClean="0">
-                <a:solidFill>
-                  <a:schemeClr val="tx1"/>
-                </a:solidFill>
-              </a:rPr>
-              <a:t>(</a:t>
-            </a:r>
-            <a:r>
-              <a:rPr lang="en-US" dirty="0" smtClean="0">
-                <a:solidFill>
-                  <a:srgbClr val="FFFF00"/>
-                </a:solidFill>
-              </a:rPr>
-              <a:t>event</a:t>
-            </a:r>
             <a:r>
               <a:rPr lang="en-US" dirty="0">
                 <a:solidFill>
                   <a:schemeClr val="tx1"/>
                 </a:solidFill>
               </a:rPr>
-              <a:t>, </a:t>
-            </a:r>
-            <a:r>
-              <a:rPr lang="en-US" dirty="0" smtClean="0">
-                <a:solidFill>
-                  <a:srgbClr val="00B0F0"/>
-                </a:solidFill>
-              </a:rPr>
-              <a:t>handler</a:t>
-            </a:r>
-            <a:r>
-              <a:rPr lang="en-US" dirty="0" smtClean="0">
-                <a:solidFill>
-                  <a:schemeClr val="tx1"/>
-                </a:solidFill>
-              </a:rPr>
-              <a:t>);</a:t>
-            </a:r>
-            <a:endParaRPr lang="en-US" dirty="0">
-              <a:solidFill>
-                <a:schemeClr val="tx1"/>
-              </a:solidFill>
-            </a:endParaRPr>
-          </a:p>
-          <a:p>
-            <a:r>
-              <a:rPr lang="en-US" dirty="0">
-                <a:solidFill>
-                  <a:schemeClr val="tx1"/>
-                </a:solidFill>
-              </a:rPr>
               <a:t>&lt;/script&gt;</a:t>
             </a:r>
-            <a:endParaRPr lang="en-US" dirty="0">
-              <a:solidFill>
-                <a:schemeClr val="tx1"/>
-              </a:solidFill>
-            </a:endParaRPr>
           </a:p>
         </p:txBody>
       </p:sp>
@@ -12104,7 +12046,7 @@
         <p:spPr>
           <a:xfrm>
             <a:off x="1066800" y="2074039"/>
-            <a:ext cx="5181600" cy="2585323"/>
+            <a:ext cx="5181600" cy="2031325"/>
           </a:xfrm>
           <a:prstGeom prst="rect">
             <a:avLst/>
@@ -12126,15 +12068,27 @@
               <a:t>event </a:t>
             </a:r>
             <a:r>
+              <a:rPr lang="en-US" dirty="0" smtClean="0"/>
+              <a:t>– </a:t>
+            </a:r>
+            <a:r>
+              <a:rPr lang="ru-RU" dirty="0"/>
+              <a:t>имя события</a:t>
+            </a:r>
+            <a:r>
               <a:rPr lang="en-US" dirty="0"/>
-              <a:t>–</a:t>
-            </a:r>
-            <a:r>
-              <a:rPr lang="ru-RU" dirty="0"/>
-              <a:t>имя события. Без приставки </a:t>
-            </a:r>
-            <a:r>
-              <a:rPr lang="en-US" dirty="0" smtClean="0"/>
+              <a:t> </a:t>
+            </a:r>
+            <a:r>
+              <a:rPr lang="ru-RU" dirty="0">
+                <a:solidFill>
+                  <a:srgbClr val="FF0000"/>
+                </a:solidFill>
+              </a:rPr>
+              <a:t>с приставкой </a:t>
+            </a:r>
+            <a:r>
+              <a:rPr lang="en-US" dirty="0"/>
               <a:t>“on”, </a:t>
             </a:r>
             <a:r>
@@ -12142,36 +12096,16 @@
               <a:t>например </a:t>
             </a:r>
             <a:r>
-              <a:rPr lang="en-US" dirty="0" smtClean="0"/>
-              <a:t>“click”, “load”, </a:t>
-            </a:r>
-            <a:r>
-              <a:rPr lang="ru-RU" dirty="0" smtClean="0"/>
-              <a:t>именование с приставкой </a:t>
-            </a:r>
-            <a:r>
-              <a:rPr lang="en-US" dirty="0" smtClean="0"/>
-              <a:t>on “</a:t>
-            </a:r>
-            <a:r>
-              <a:rPr lang="en-US" dirty="0" err="1" smtClean="0"/>
+              <a:rPr lang="en-US" dirty="0"/>
+              <a:t>“</a:t>
+            </a:r>
+            <a:r>
+              <a:rPr lang="en-US" dirty="0" err="1"/>
               <a:t>onclick</a:t>
             </a:r>
             <a:r>
-              <a:rPr lang="en-US" dirty="0" smtClean="0"/>
-              <a:t>”, “</a:t>
-            </a:r>
-            <a:r>
-              <a:rPr lang="en-US" dirty="0" err="1" smtClean="0"/>
-              <a:t>onload</a:t>
-            </a:r>
-            <a:r>
-              <a:rPr lang="en-US" dirty="0" smtClean="0"/>
+              <a:rPr lang="en-US" smtClean="0"/>
               <a:t>”</a:t>
-            </a:r>
-            <a:r>
-              <a:rPr lang="ru-RU" dirty="0" smtClean="0"/>
-              <a:t> не допускается</a:t>
             </a:r>
             <a:endParaRPr lang="en-US" dirty="0" smtClean="0"/>
           </a:p>

</xml_diff>